<commit_message>
[Docs] Update Architecture Overview Chart (#478)
* updateArchitectureOverviewChart

* updatePPTX
</commit_message>
<xml_diff>
--- a/doc/img/architecture-overview.pptx
+++ b/doc/img/architecture-overview.pptx
@@ -123,10 +123,6 @@
 </p:presentation>
 </file>
 
-<file path=ppt/revisionInfo.xml><?xml version="1.0" encoding="utf-8"?>
-<p1510:revInfo xmlns:a="http://schemas.openxmlformats.org/drawingml/2006/main" xmlns:r="http://schemas.openxmlformats.org/officeDocument/2006/relationships" xmlns:p1510="http://schemas.microsoft.com/office/powerpoint/2015/10/main"/>
-</file>
-
 <file path=ppt/slideLayouts/slideLayout1.xml><?xml version="1.0" encoding="utf-8"?>
 <p:sldLayout xmlns:a="http://schemas.openxmlformats.org/drawingml/2006/main" xmlns:r="http://schemas.openxmlformats.org/officeDocument/2006/relationships" xmlns:p="http://schemas.openxmlformats.org/presentationml/2006/main" type="title" preserve="1">
   <p:cSld name="Titelfolie">
@@ -276,7 +272,7 @@
           <a:p>
             <a:fld id="{6D488BD2-38B4-499E-A377-29A324A7A0C1}" type="datetimeFigureOut">
               <a:rPr lang="de-AT" smtClean="0"/>
-              <a:t>06.10.2017</a:t>
+              <a:t>01.06.2023</a:t>
             </a:fld>
             <a:endParaRPr lang="de-AT"/>
           </a:p>
@@ -330,7 +326,7 @@
           <a:p>
             <a:fld id="{86EC862E-95D3-4663-8956-B69DF366FAF3}" type="slidenum">
               <a:rPr lang="de-AT" smtClean="0"/>
-              <a:t>‹Nr.›</a:t>
+              <a:t>‹#›</a:t>
             </a:fld>
             <a:endParaRPr lang="de-AT"/>
           </a:p>
@@ -476,7 +472,7 @@
           <a:p>
             <a:fld id="{6D488BD2-38B4-499E-A377-29A324A7A0C1}" type="datetimeFigureOut">
               <a:rPr lang="de-AT" smtClean="0"/>
-              <a:t>06.10.2017</a:t>
+              <a:t>01.06.2023</a:t>
             </a:fld>
             <a:endParaRPr lang="de-AT"/>
           </a:p>
@@ -530,7 +526,7 @@
           <a:p>
             <a:fld id="{86EC862E-95D3-4663-8956-B69DF366FAF3}" type="slidenum">
               <a:rPr lang="de-AT" smtClean="0"/>
-              <a:t>‹Nr.›</a:t>
+              <a:t>‹#›</a:t>
             </a:fld>
             <a:endParaRPr lang="de-AT"/>
           </a:p>
@@ -686,7 +682,7 @@
           <a:p>
             <a:fld id="{6D488BD2-38B4-499E-A377-29A324A7A0C1}" type="datetimeFigureOut">
               <a:rPr lang="de-AT" smtClean="0"/>
-              <a:t>06.10.2017</a:t>
+              <a:t>01.06.2023</a:t>
             </a:fld>
             <a:endParaRPr lang="de-AT"/>
           </a:p>
@@ -740,7 +736,7 @@
           <a:p>
             <a:fld id="{86EC862E-95D3-4663-8956-B69DF366FAF3}" type="slidenum">
               <a:rPr lang="de-AT" smtClean="0"/>
-              <a:t>‹Nr.›</a:t>
+              <a:t>‹#›</a:t>
             </a:fld>
             <a:endParaRPr lang="de-AT"/>
           </a:p>
@@ -886,7 +882,7 @@
           <a:p>
             <a:fld id="{6D488BD2-38B4-499E-A377-29A324A7A0C1}" type="datetimeFigureOut">
               <a:rPr lang="de-AT" smtClean="0"/>
-              <a:t>06.10.2017</a:t>
+              <a:t>01.06.2023</a:t>
             </a:fld>
             <a:endParaRPr lang="de-AT"/>
           </a:p>
@@ -940,7 +936,7 @@
           <a:p>
             <a:fld id="{86EC862E-95D3-4663-8956-B69DF366FAF3}" type="slidenum">
               <a:rPr lang="de-AT" smtClean="0"/>
-              <a:t>‹Nr.›</a:t>
+              <a:t>‹#›</a:t>
             </a:fld>
             <a:endParaRPr lang="de-AT"/>
           </a:p>
@@ -1162,7 +1158,7 @@
           <a:p>
             <a:fld id="{6D488BD2-38B4-499E-A377-29A324A7A0C1}" type="datetimeFigureOut">
               <a:rPr lang="de-AT" smtClean="0"/>
-              <a:t>06.10.2017</a:t>
+              <a:t>01.06.2023</a:t>
             </a:fld>
             <a:endParaRPr lang="de-AT"/>
           </a:p>
@@ -1216,7 +1212,7 @@
           <a:p>
             <a:fld id="{86EC862E-95D3-4663-8956-B69DF366FAF3}" type="slidenum">
               <a:rPr lang="de-AT" smtClean="0"/>
-              <a:t>‹Nr.›</a:t>
+              <a:t>‹#›</a:t>
             </a:fld>
             <a:endParaRPr lang="de-AT"/>
           </a:p>
@@ -1430,7 +1426,7 @@
           <a:p>
             <a:fld id="{6D488BD2-38B4-499E-A377-29A324A7A0C1}" type="datetimeFigureOut">
               <a:rPr lang="de-AT" smtClean="0"/>
-              <a:t>06.10.2017</a:t>
+              <a:t>01.06.2023</a:t>
             </a:fld>
             <a:endParaRPr lang="de-AT"/>
           </a:p>
@@ -1484,7 +1480,7 @@
           <a:p>
             <a:fld id="{86EC862E-95D3-4663-8956-B69DF366FAF3}" type="slidenum">
               <a:rPr lang="de-AT" smtClean="0"/>
-              <a:t>‹Nr.›</a:t>
+              <a:t>‹#›</a:t>
             </a:fld>
             <a:endParaRPr lang="de-AT"/>
           </a:p>
@@ -1845,7 +1841,7 @@
           <a:p>
             <a:fld id="{6D488BD2-38B4-499E-A377-29A324A7A0C1}" type="datetimeFigureOut">
               <a:rPr lang="de-AT" smtClean="0"/>
-              <a:t>06.10.2017</a:t>
+              <a:t>01.06.2023</a:t>
             </a:fld>
             <a:endParaRPr lang="de-AT"/>
           </a:p>
@@ -1899,7 +1895,7 @@
           <a:p>
             <a:fld id="{86EC862E-95D3-4663-8956-B69DF366FAF3}" type="slidenum">
               <a:rPr lang="de-AT" smtClean="0"/>
-              <a:t>‹Nr.›</a:t>
+              <a:t>‹#›</a:t>
             </a:fld>
             <a:endParaRPr lang="de-AT"/>
           </a:p>
@@ -1987,7 +1983,7 @@
           <a:p>
             <a:fld id="{6D488BD2-38B4-499E-A377-29A324A7A0C1}" type="datetimeFigureOut">
               <a:rPr lang="de-AT" smtClean="0"/>
-              <a:t>06.10.2017</a:t>
+              <a:t>01.06.2023</a:t>
             </a:fld>
             <a:endParaRPr lang="de-AT"/>
           </a:p>
@@ -2041,7 +2037,7 @@
           <a:p>
             <a:fld id="{86EC862E-95D3-4663-8956-B69DF366FAF3}" type="slidenum">
               <a:rPr lang="de-AT" smtClean="0"/>
-              <a:t>‹Nr.›</a:t>
+              <a:t>‹#›</a:t>
             </a:fld>
             <a:endParaRPr lang="de-AT"/>
           </a:p>
@@ -2100,7 +2096,7 @@
           <a:p>
             <a:fld id="{6D488BD2-38B4-499E-A377-29A324A7A0C1}" type="datetimeFigureOut">
               <a:rPr lang="de-AT" smtClean="0"/>
-              <a:t>06.10.2017</a:t>
+              <a:t>01.06.2023</a:t>
             </a:fld>
             <a:endParaRPr lang="de-AT"/>
           </a:p>
@@ -2154,7 +2150,7 @@
           <a:p>
             <a:fld id="{86EC862E-95D3-4663-8956-B69DF366FAF3}" type="slidenum">
               <a:rPr lang="de-AT" smtClean="0"/>
-              <a:t>‹Nr.›</a:t>
+              <a:t>‹#›</a:t>
             </a:fld>
             <a:endParaRPr lang="de-AT"/>
           </a:p>
@@ -2413,7 +2409,7 @@
           <a:p>
             <a:fld id="{6D488BD2-38B4-499E-A377-29A324A7A0C1}" type="datetimeFigureOut">
               <a:rPr lang="de-AT" smtClean="0"/>
-              <a:t>06.10.2017</a:t>
+              <a:t>01.06.2023</a:t>
             </a:fld>
             <a:endParaRPr lang="de-AT"/>
           </a:p>
@@ -2467,7 +2463,7 @@
           <a:p>
             <a:fld id="{86EC862E-95D3-4663-8956-B69DF366FAF3}" type="slidenum">
               <a:rPr lang="de-AT" smtClean="0"/>
-              <a:t>‹Nr.›</a:t>
+              <a:t>‹#›</a:t>
             </a:fld>
             <a:endParaRPr lang="de-AT"/>
           </a:p>
@@ -2702,7 +2698,7 @@
           <a:p>
             <a:fld id="{6D488BD2-38B4-499E-A377-29A324A7A0C1}" type="datetimeFigureOut">
               <a:rPr lang="de-AT" smtClean="0"/>
-              <a:t>06.10.2017</a:t>
+              <a:t>01.06.2023</a:t>
             </a:fld>
             <a:endParaRPr lang="de-AT"/>
           </a:p>
@@ -2756,7 +2752,7 @@
           <a:p>
             <a:fld id="{86EC862E-95D3-4663-8956-B69DF366FAF3}" type="slidenum">
               <a:rPr lang="de-AT" smtClean="0"/>
-              <a:t>‹Nr.›</a:t>
+              <a:t>‹#›</a:t>
             </a:fld>
             <a:endParaRPr lang="de-AT"/>
           </a:p>
@@ -2945,7 +2941,7 @@
           <a:p>
             <a:fld id="{6D488BD2-38B4-499E-A377-29A324A7A0C1}" type="datetimeFigureOut">
               <a:rPr lang="de-AT" smtClean="0"/>
-              <a:t>06.10.2017</a:t>
+              <a:t>01.06.2023</a:t>
             </a:fld>
             <a:endParaRPr lang="de-AT"/>
           </a:p>
@@ -3035,7 +3031,7 @@
           <a:p>
             <a:fld id="{86EC862E-95D3-4663-8956-B69DF366FAF3}" type="slidenum">
               <a:rPr lang="de-AT" smtClean="0"/>
-              <a:t>‹Nr.›</a:t>
+              <a:t>‹#›</a:t>
             </a:fld>
             <a:endParaRPr lang="de-AT"/>
           </a:p>
@@ -3376,10 +3372,10 @@
         </p:nvGrpSpPr>
         <p:grpSpPr>
           <a:xfrm>
-            <a:off x="420570" y="176463"/>
-            <a:ext cx="11354335" cy="6521116"/>
-            <a:chOff x="645160" y="710698"/>
-            <a:chExt cx="6860691" cy="4819016"/>
+            <a:off x="445197" y="168442"/>
+            <a:ext cx="11301606" cy="6521116"/>
+            <a:chOff x="677021" y="710698"/>
+            <a:chExt cx="6828830" cy="4819016"/>
           </a:xfrm>
         </p:grpSpPr>
         <p:sp>
@@ -3396,8 +3392,8 @@
           </p:nvSpPr>
           <p:spPr>
             <a:xfrm>
-              <a:off x="645160" y="710699"/>
-              <a:ext cx="3366515" cy="1242901"/>
+              <a:off x="677021" y="710698"/>
+              <a:ext cx="3366515" cy="1427734"/>
             </a:xfrm>
             <a:prstGeom prst="roundRect">
               <a:avLst>
@@ -3513,7 +3509,7 @@
           </p:nvSpPr>
           <p:spPr>
             <a:xfrm>
-              <a:off x="745611" y="1512906"/>
+              <a:off x="772819" y="1603278"/>
               <a:ext cx="1555597" cy="363600"/>
             </a:xfrm>
             <a:prstGeom prst="roundRect">
@@ -3591,7 +3587,7 @@
           </p:nvSpPr>
           <p:spPr>
             <a:xfrm>
-              <a:off x="745611" y="1098166"/>
+              <a:off x="772818" y="1135277"/>
               <a:ext cx="1555597" cy="363600"/>
             </a:xfrm>
             <a:prstGeom prst="roundRect">
@@ -3669,7 +3665,7 @@
           </p:nvSpPr>
           <p:spPr>
             <a:xfrm>
-              <a:off x="2360279" y="1512906"/>
+              <a:off x="2387489" y="1603278"/>
               <a:ext cx="1555597" cy="363600"/>
             </a:xfrm>
             <a:prstGeom prst="roundRect">
@@ -3780,7 +3776,7 @@
           </p:nvSpPr>
           <p:spPr>
             <a:xfrm>
-              <a:off x="2360279" y="1098166"/>
+              <a:off x="2387489" y="1135277"/>
               <a:ext cx="1555597" cy="363600"/>
             </a:xfrm>
             <a:prstGeom prst="roundRect">
@@ -3872,7 +3868,7 @@
           </p:nvSpPr>
           <p:spPr>
             <a:xfrm>
-              <a:off x="672370" y="2959915"/>
+              <a:off x="677021" y="3306287"/>
               <a:ext cx="1656048" cy="1120987"/>
             </a:xfrm>
             <a:prstGeom prst="roundRect">
@@ -3975,7 +3971,7 @@
           </p:nvSpPr>
           <p:spPr>
             <a:xfrm>
-              <a:off x="772821" y="3451480"/>
+              <a:off x="783796" y="3815080"/>
               <a:ext cx="1442497" cy="363600"/>
             </a:xfrm>
             <a:prstGeom prst="roundRect">
@@ -4070,8 +4066,8 @@
           </p:nvSpPr>
           <p:spPr>
             <a:xfrm>
-              <a:off x="672370" y="2009987"/>
-              <a:ext cx="3366515" cy="884832"/>
+              <a:off x="677021" y="2279944"/>
+              <a:ext cx="3361864" cy="884832"/>
             </a:xfrm>
             <a:prstGeom prst="roundRect">
               <a:avLst>
@@ -4173,7 +4169,7 @@
           </p:nvSpPr>
           <p:spPr>
             <a:xfrm>
-              <a:off x="772821" y="2385599"/>
+              <a:off x="783796" y="2647225"/>
               <a:ext cx="1555597" cy="363600"/>
             </a:xfrm>
             <a:prstGeom prst="roundRect">
@@ -4268,7 +4264,7 @@
           </p:nvSpPr>
           <p:spPr>
             <a:xfrm>
-              <a:off x="2387489" y="2385599"/>
+              <a:off x="2387489" y="2638005"/>
               <a:ext cx="1555597" cy="363600"/>
             </a:xfrm>
             <a:prstGeom prst="roundRect">
@@ -4397,8 +4393,8 @@
           </p:nvSpPr>
           <p:spPr>
             <a:xfrm>
-              <a:off x="2387489" y="2959915"/>
-              <a:ext cx="1651396" cy="1120987"/>
+              <a:off x="2387489" y="3296193"/>
+              <a:ext cx="1651396" cy="1129370"/>
             </a:xfrm>
             <a:prstGeom prst="roundRect">
               <a:avLst>
@@ -4497,7 +4493,7 @@
           </p:nvSpPr>
           <p:spPr>
             <a:xfrm>
-              <a:off x="2504641" y="3451480"/>
+              <a:off x="2493964" y="3834644"/>
               <a:ext cx="1438445" cy="363600"/>
             </a:xfrm>
             <a:prstGeom prst="roundRect">
@@ -4606,8 +4602,8 @@
           </p:nvSpPr>
           <p:spPr>
             <a:xfrm>
-              <a:off x="672370" y="4163420"/>
-              <a:ext cx="3366515" cy="884832"/>
+              <a:off x="677021" y="4588734"/>
+              <a:ext cx="3366515" cy="940980"/>
             </a:xfrm>
             <a:prstGeom prst="roundRect">
               <a:avLst>
@@ -4692,7 +4688,7 @@
           </p:nvSpPr>
           <p:spPr>
             <a:xfrm>
-              <a:off x="772821" y="4533103"/>
+              <a:off x="772821" y="4997982"/>
               <a:ext cx="1555597" cy="363600"/>
             </a:xfrm>
             <a:prstGeom prst="roundRect">
@@ -4770,7 +4766,7 @@
           </p:nvSpPr>
           <p:spPr>
             <a:xfrm>
-              <a:off x="2387489" y="4533103"/>
+              <a:off x="2387489" y="4997982"/>
               <a:ext cx="1555597" cy="363600"/>
             </a:xfrm>
             <a:prstGeom prst="roundRect">
@@ -6310,126 +6306,6 @@
         </p:sp>
         <p:sp>
           <p:nvSpPr>
-            <p:cNvPr id="69" name="Abgerundetes Rechteck 6">
-              <a:extLst>
-                <a:ext uri="{FF2B5EF4-FFF2-40B4-BE49-F238E27FC236}">
-                  <a16:creationId xmlns:a16="http://schemas.microsoft.com/office/drawing/2014/main" id="{7C56F858-8EC2-42CD-9AF7-ABDDC5D19556}"/>
-                </a:ext>
-              </a:extLst>
-            </p:cNvPr>
-            <p:cNvSpPr/>
-            <p:nvPr/>
-          </p:nvSpPr>
-          <p:spPr>
-            <a:xfrm>
-              <a:off x="672370" y="5143965"/>
-              <a:ext cx="3366515" cy="385749"/>
-            </a:xfrm>
-            <a:prstGeom prst="roundRect">
-              <a:avLst>
-                <a:gd name="adj" fmla="val 25045"/>
-              </a:avLst>
-            </a:prstGeom>
-            <a:gradFill>
-              <a:gsLst>
-                <a:gs pos="75000">
-                  <a:sysClr val="window" lastClr="FFFFFF"/>
-                </a:gs>
-                <a:gs pos="100000">
-                  <a:srgbClr val="641EB4">
-                    <a:lumMod val="14000"/>
-                    <a:lumOff val="86000"/>
-                  </a:srgbClr>
-                </a:gs>
-              </a:gsLst>
-              <a:lin ang="4200000" scaled="0"/>
-            </a:gradFill>
-            <a:ln w="12700" cap="flat" cmpd="sng" algn="ctr">
-              <a:solidFill>
-                <a:srgbClr val="641EB4"/>
-              </a:solidFill>
-              <a:prstDash val="solid"/>
-              <a:miter lim="800000"/>
-            </a:ln>
-            <a:effectLst/>
-          </p:spPr>
-          <p:txBody>
-            <a:bodyPr vert="horz" rtlCol="0" anchor="ctr" anchorCtr="0"/>
-            <a:lstStyle/>
-            <a:p>
-              <a:pPr marL="0" marR="0" lvl="0" indent="0" algn="ctr" defTabSz="914400" eaLnBrk="1" fontAlgn="auto" latinLnBrk="0" hangingPunct="1">
-                <a:lnSpc>
-                  <a:spcPct val="100000"/>
-                </a:lnSpc>
-                <a:spcBef>
-                  <a:spcPts val="0"/>
-                </a:spcBef>
-                <a:spcAft>
-                  <a:spcPts val="0"/>
-                </a:spcAft>
-                <a:buClrTx/>
-                <a:buSzTx/>
-                <a:buFontTx/>
-                <a:buNone/>
-                <a:tabLst/>
-                <a:defRPr/>
-              </a:pPr>
-              <a:r>
-                <a:rPr kumimoji="0" lang="de-DE" sz="1600" b="1" i="0" u="none" strike="noStrike" kern="0" cap="none" spc="0" normalizeH="0" baseline="0" noProof="0" dirty="0">
-                  <a:ln>
-                    <a:noFill/>
-                  </a:ln>
-                  <a:solidFill>
-                    <a:srgbClr val="641EB4"/>
-                  </a:solidFill>
-                  <a:effectLst/>
-                  <a:uLnTx/>
-                  <a:uFillTx/>
-                  <a:latin typeface="Gilroy"/>
-                  <a:ea typeface="+mn-ea"/>
-                  <a:cs typeface="+mn-cs"/>
-                </a:rPr>
-                <a:t>SSO / </a:t>
-              </a:r>
-              <a:r>
-                <a:rPr kumimoji="0" lang="de-DE" sz="1600" b="1" i="0" u="none" strike="noStrike" kern="0" cap="none" spc="0" normalizeH="0" baseline="0" noProof="0" dirty="0" err="1">
-                  <a:ln>
-                    <a:noFill/>
-                  </a:ln>
-                  <a:solidFill>
-                    <a:srgbClr val="641EB4"/>
-                  </a:solidFill>
-                  <a:effectLst/>
-                  <a:uLnTx/>
-                  <a:uFillTx/>
-                  <a:latin typeface="Gilroy"/>
-                  <a:ea typeface="+mn-ea"/>
-                  <a:cs typeface="+mn-cs"/>
-                </a:rPr>
-                <a:t>Social</a:t>
-              </a:r>
-              <a:r>
-                <a:rPr kumimoji="0" lang="de-DE" sz="1600" b="1" i="0" u="none" strike="noStrike" kern="0" cap="none" spc="0" normalizeH="0" baseline="0" noProof="0" dirty="0">
-                  <a:ln>
-                    <a:noFill/>
-                  </a:ln>
-                  <a:solidFill>
-                    <a:srgbClr val="641EB4"/>
-                  </a:solidFill>
-                  <a:effectLst/>
-                  <a:uLnTx/>
-                  <a:uFillTx/>
-                  <a:latin typeface="Gilroy"/>
-                  <a:ea typeface="+mn-ea"/>
-                  <a:cs typeface="+mn-cs"/>
-                </a:rPr>
-                <a:t> Logins</a:t>
-              </a:r>
-            </a:p>
-          </p:txBody>
-        </p:sp>
-        <p:sp>
-          <p:nvSpPr>
             <p:cNvPr id="70" name="Abgerundetes Rechteck 6">
               <a:extLst>
                 <a:ext uri="{FF2B5EF4-FFF2-40B4-BE49-F238E27FC236}">

</xml_diff>